<commit_message>
Añadiendo Flows a Scrum
</commit_message>
<xml_diff>
--- a/Estilos/Scrum/Scrum_Gamedia.pptx
+++ b/Estilos/Scrum/Scrum_Gamedia.pptx
@@ -6,7 +6,7 @@
     <p:sldMasterId id="2147483650" r:id="rId2"/>
   </p:sldMasterIdLst>
   <p:notesMasterIdLst>
-    <p:notesMasterId r:id="rId9"/>
+    <p:notesMasterId r:id="rId10"/>
   </p:notesMasterIdLst>
   <p:sldIdLst>
     <p:sldId id="256" r:id="rId3"/>
@@ -15,6 +15,7 @@
     <p:sldId id="259" r:id="rId6"/>
     <p:sldId id="260" r:id="rId7"/>
     <p:sldId id="262" r:id="rId8"/>
+    <p:sldId id="263" r:id="rId9"/>
   </p:sldIdLst>
   <p:sldSz cx="12192000" cy="6858000"/>
   <p:notesSz cx="9144000" cy="6858000"/>
@@ -248,8 +249,11 @@
     </a:lvl9pPr>
   </p:defaultTextStyle>
   <p:extLst>
+    <p:ext uri="{EFAFB233-063F-42B5-8137-9DF3F51BA10A}">
+      <p15:sldGuideLst xmlns:p15="http://schemas.microsoft.com/office/powerpoint/2012/main"/>
+    </p:ext>
     <p:ext uri="http://customooxmlschemas.google.com/">
-      <go:slidesCustomData xmlns:go="http://customooxmlschemas.google.com/" xmlns:ahyp="http://schemas.microsoft.com/office/drawing/2018/hyperlinkcolor" xmlns:p15="http://schemas.microsoft.com/office/powerpoint/2012/main" xmlns:p14="http://schemas.microsoft.com/office/powerpoint/2010/main" xmlns:com="http://schemas.openxmlformats.org/drawingml/2006/compatibility" xmlns:pvml="urn:schemas-microsoft-com:office:powerpoint" xmlns:v="urn:schemas-microsoft-com:vml" xmlns:o="urn:schemas-microsoft-com:office:office" xmlns:dgm="http://schemas.openxmlformats.org/drawingml/2006/diagram" xmlns:c="http://schemas.openxmlformats.org/drawingml/2006/chart" xmlns:mv="urn:schemas-microsoft-com:mac:vml" xmlns:mc="http://schemas.openxmlformats.org/markup-compatibility/2006" xmlns="" r:id="rId22" roundtripDataSignature="AMtx7mjc5BVab5jJEaOHwvPZsgTDMBYY3g=="/>
+      <go:slidesCustomData xmlns="" xmlns:mc="http://schemas.openxmlformats.org/markup-compatibility/2006" xmlns:mv="urn:schemas-microsoft-com:mac:vml" xmlns:c="http://schemas.openxmlformats.org/drawingml/2006/chart" xmlns:dgm="http://schemas.openxmlformats.org/drawingml/2006/diagram" xmlns:o="urn:schemas-microsoft-com:office:office" xmlns:v="urn:schemas-microsoft-com:vml" xmlns:pvml="urn:schemas-microsoft-com:office:powerpoint" xmlns:com="http://schemas.openxmlformats.org/drawingml/2006/compatibility" xmlns:p14="http://schemas.microsoft.com/office/powerpoint/2010/main" xmlns:p15="http://schemas.microsoft.com/office/powerpoint/2012/main" xmlns:ahyp="http://schemas.microsoft.com/office/drawing/2018/hyperlinkcolor" xmlns:go="http://customooxmlschemas.google.com/" r:id="rId22" roundtripDataSignature="AMtx7mjc5BVab5jJEaOHwvPZsgTDMBYY3g=="/>
     </p:ext>
   </p:extLst>
 </p:presentation>
@@ -15081,6 +15085,13 @@
   <p:clrMapOvr>
     <a:masterClrMapping/>
   </p:clrMapOvr>
+  <p:timing>
+    <p:tnLst>
+      <p:par>
+        <p:cTn id="1" dur="indefinite" restart="never" nodeType="tmRoot"/>
+      </p:par>
+    </p:tnLst>
+  </p:timing>
 </p:sld>
 </file>
 
@@ -15688,6 +15699,13 @@
   <p:clrMapOvr>
     <a:masterClrMapping/>
   </p:clrMapOvr>
+  <p:timing>
+    <p:tnLst>
+      <p:par>
+        <p:cTn id="1" dur="indefinite" restart="never" nodeType="tmRoot"/>
+      </p:par>
+    </p:tnLst>
+  </p:timing>
 </p:sld>
 </file>
 
@@ -15991,19 +16009,7 @@
                 <a:cs typeface="Calibri"/>
                 <a:sym typeface="Calibri"/>
               </a:rPr>
-              <a:t>Descubrir juegos y opiniones</a:t>
-            </a:r>
-            <a:r>
-              <a:rPr lang="es-ES" sz="1800" dirty="0" smtClean="0">
-                <a:solidFill>
-                  <a:schemeClr val="dk1"/>
-                </a:solidFill>
-                <a:latin typeface="Calibri"/>
-                <a:ea typeface="Calibri"/>
-                <a:cs typeface="Calibri"/>
-                <a:sym typeface="Calibri"/>
-              </a:rPr>
-              <a:t> nuevas</a:t>
+              <a:t>Descubrir juegos y opiniones nuevas</a:t>
             </a:r>
             <a:r>
               <a:rPr lang="es-ES" sz="1800" dirty="0">
@@ -16280,6 +16286,13 @@
   <p:clrMapOvr>
     <a:masterClrMapping/>
   </p:clrMapOvr>
+  <p:timing>
+    <p:tnLst>
+      <p:par>
+        <p:cTn id="1" dur="indefinite" restart="never" nodeType="tmRoot"/>
+      </p:par>
+    </p:tnLst>
+  </p:timing>
 </p:sld>
 </file>
 
@@ -17335,6 +17348,13 @@
   <p:clrMapOvr>
     <a:masterClrMapping/>
   </p:clrMapOvr>
+  <p:timing>
+    <p:tnLst>
+      <p:par>
+        <p:cTn id="1" dur="indefinite" restart="never" nodeType="tmRoot"/>
+      </p:par>
+    </p:tnLst>
+  </p:timing>
 </p:sld>
 </file>
 
@@ -21629,6 +21649,13 @@
   <p:clrMapOvr>
     <a:masterClrMapping/>
   </p:clrMapOvr>
+  <p:timing>
+    <p:tnLst>
+      <p:par>
+        <p:cTn id="1" dur="indefinite" restart="never" nodeType="tmRoot"/>
+      </p:par>
+    </p:tnLst>
+  </p:timing>
 </p:sld>
 </file>
 
@@ -21684,7 +21711,7 @@
               <a:buNone/>
             </a:pPr>
             <a:r>
-              <a:rPr lang="es-ES" sz="2000" b="1">
+              <a:rPr lang="es-ES" sz="2000" b="1" dirty="0">
                 <a:solidFill>
                   <a:srgbClr val="FF0000"/>
                 </a:solidFill>
@@ -21695,7 +21722,7 @@
               </a:rPr>
               <a:t>JOURNEY MAP SCENARIOS TEMPLATE</a:t>
             </a:r>
-            <a:endParaRPr/>
+            <a:endParaRPr dirty="0"/>
           </a:p>
           <a:p>
             <a:pPr marL="0" marR="0" lvl="0" indent="0" algn="l" rtl="0">
@@ -21707,7 +21734,7 @@
               </a:spcAft>
               <a:buNone/>
             </a:pPr>
-            <a:endParaRPr sz="1800">
+            <a:endParaRPr sz="1800" dirty="0">
               <a:solidFill>
                 <a:schemeClr val="dk1"/>
               </a:solidFill>
@@ -24633,19 +24660,7 @@
                 <a:cs typeface="Calibri"/>
                 <a:sym typeface="Calibri"/>
               </a:rPr>
-              <a:t>Tengo que opinar sobre este jueg</a:t>
-            </a:r>
-            <a:r>
-              <a:rPr lang="es-ES" sz="1200" dirty="0" smtClean="0">
-                <a:solidFill>
-                  <a:schemeClr val="dk1"/>
-                </a:solidFill>
-                <a:latin typeface="Calibri"/>
-                <a:ea typeface="Calibri"/>
-                <a:cs typeface="Calibri"/>
-                <a:sym typeface="Calibri"/>
-              </a:rPr>
-              <a:t>o.</a:t>
+              <a:t>Tengo que opinar sobre este juego.</a:t>
             </a:r>
             <a:endParaRPr dirty="0"/>
           </a:p>
@@ -24931,6 +24946,114 @@
   <p:clrMapOvr>
     <a:masterClrMapping/>
   </p:clrMapOvr>
+  <p:timing>
+    <p:tnLst>
+      <p:par>
+        <p:cTn id="1" dur="indefinite" restart="never" nodeType="tmRoot"/>
+      </p:par>
+    </p:tnLst>
+  </p:timing>
+</p:sld>
+</file>
+
+<file path=ppt/slides/slide7.xml><?xml version="1.0" encoding="utf-8"?>
+<p:sld xmlns:a="http://schemas.openxmlformats.org/drawingml/2006/main" xmlns:r="http://schemas.openxmlformats.org/officeDocument/2006/relationships" xmlns:p="http://schemas.openxmlformats.org/presentationml/2006/main">
+  <p:cSld>
+    <p:spTree>
+      <p:nvGrpSpPr>
+        <p:cNvPr id="1" name=""/>
+        <p:cNvGrpSpPr/>
+        <p:nvPr/>
+      </p:nvGrpSpPr>
+      <p:grpSpPr>
+        <a:xfrm>
+          <a:off x="0" y="0"/>
+          <a:ext cx="0" cy="0"/>
+          <a:chOff x="0" y="0"/>
+          <a:chExt cx="0" cy="0"/>
+        </a:xfrm>
+      </p:grpSpPr>
+      <p:sp>
+        <p:nvSpPr>
+          <p:cNvPr id="2" name="Título 1"/>
+          <p:cNvSpPr>
+            <a:spLocks noGrp="1"/>
+          </p:cNvSpPr>
+          <p:nvPr>
+            <p:ph type="title"/>
+          </p:nvPr>
+        </p:nvSpPr>
+        <p:spPr/>
+        <p:txBody>
+          <a:bodyPr/>
+          <a:lstStyle/>
+          <a:p>
+            <a:r>
+              <a:rPr lang="es-ES" sz="2000" b="1" dirty="0" smtClean="0">
+                <a:solidFill>
+                  <a:srgbClr val="FF0000"/>
+                </a:solidFill>
+              </a:rPr>
+              <a:t>FLOWS</a:t>
+            </a:r>
+            <a:r>
+              <a:rPr lang="es-ES" dirty="0"/>
+              <a:t/>
+            </a:r>
+            <a:br>
+              <a:rPr lang="es-ES" dirty="0"/>
+            </a:br>
+            <a:endParaRPr lang="es-ES" dirty="0"/>
+          </a:p>
+        </p:txBody>
+      </p:sp>
+      <p:pic>
+        <p:nvPicPr>
+          <p:cNvPr id="4" name="Imagen 3"/>
+          <p:cNvPicPr>
+            <a:picLocks noChangeAspect="1"/>
+          </p:cNvPicPr>
+          <p:nvPr/>
+        </p:nvPicPr>
+        <p:blipFill>
+          <a:blip r:embed="rId2">
+            <a:extLst>
+              <a:ext uri="{28A0092B-C50C-407E-A947-70E740481C1C}">
+                <a14:useLocalDpi xmlns:a14="http://schemas.microsoft.com/office/drawing/2010/main" val="0"/>
+              </a:ext>
+            </a:extLst>
+          </a:blip>
+          <a:stretch>
+            <a:fillRect/>
+          </a:stretch>
+        </p:blipFill>
+        <p:spPr>
+          <a:xfrm>
+            <a:off x="592331" y="1027906"/>
+            <a:ext cx="12367329" cy="5605772"/>
+          </a:xfrm>
+          <a:prstGeom prst="rect">
+            <a:avLst/>
+          </a:prstGeom>
+        </p:spPr>
+      </p:pic>
+    </p:spTree>
+    <p:extLst>
+      <p:ext uri="{BB962C8B-B14F-4D97-AF65-F5344CB8AC3E}">
+        <p14:creationId xmlns:p14="http://schemas.microsoft.com/office/powerpoint/2010/main" val="1210319515"/>
+      </p:ext>
+    </p:extLst>
+  </p:cSld>
+  <p:clrMapOvr>
+    <a:masterClrMapping/>
+  </p:clrMapOvr>
+  <p:timing>
+    <p:tnLst>
+      <p:par>
+        <p:cTn id="1" dur="indefinite" restart="never" nodeType="tmRoot"/>
+      </p:par>
+    </p:tnLst>
+  </p:timing>
 </p:sld>
 </file>
 

</xml_diff>